<commit_message>
Added confusion matrix diagram
</commit_message>
<xml_diff>
--- a/trees_tuning.pptx
+++ b/trees_tuning.pptx
@@ -111,7 +111,7 @@
   </p:defaultTextStyle>
   <p:extLst>
     <p:ext uri="{EFAFB233-063F-42B5-8137-9DF3F51BA10A}">
-      <p15:sldGuideLst xmlns:p15="http://schemas.microsoft.com/office/powerpoint/2012/main" xmlns="">
+      <p15:sldGuideLst xmlns="" xmlns:p15="http://schemas.microsoft.com/office/powerpoint/2012/main">
         <p15:guide id="1" orient="horz" pos="2160">
           <p15:clr>
             <a:srgbClr val="A4A3A4"/>
@@ -2558,7 +2558,7 @@
           <a:graphicData uri="http://schemas.openxmlformats.org/presentationml/2006/ole">
             <mc:AlternateContent xmlns:mc="http://schemas.openxmlformats.org/markup-compatibility/2006">
               <mc:Choice xmlns:v="urn:schemas-microsoft-com:vml" Requires="v">
-                <p:oleObj spid="_x0000_s2121" name="think-cell Slide" r:id="rId4" imgW="0" imgH="0" progId="TCLayout.ActiveDocument.1">
+                <p:oleObj spid="_x0000_s2127" name="think-cell Slide" r:id="rId4" imgW="0" imgH="0" progId="TCLayout.ActiveDocument.1">
                   <p:embed/>
                 </p:oleObj>
               </mc:Choice>
@@ -3031,7 +3031,7 @@
           <a:graphicData uri="http://schemas.openxmlformats.org/presentationml/2006/ole">
             <mc:AlternateContent xmlns:mc="http://schemas.openxmlformats.org/markup-compatibility/2006">
               <mc:Choice xmlns:v="urn:schemas-microsoft-com:vml" Requires="v">
-                <p:oleObj spid="_x0000_s1097" name="think-cell Slide" r:id="rId4" imgW="270" imgH="270" progId="TCLayout.ActiveDocument.1">
+                <p:oleObj spid="_x0000_s1103" name="think-cell Slide" r:id="rId4" imgW="270" imgH="270" progId="TCLayout.ActiveDocument.1">
                   <p:embed/>
                 </p:oleObj>
               </mc:Choice>
@@ -5720,7 +5720,7 @@
         <p:spPr>
           <a:xfrm>
             <a:off x="365760" y="838200"/>
-            <a:ext cx="8305800" cy="5509200"/>
+            <a:ext cx="8305800" cy="5586145"/>
           </a:xfrm>
           <a:prstGeom prst="rect">
             <a:avLst/>
@@ -5776,7 +5776,7 @@
             </a:r>
             <a:r>
               <a:rPr lang="en-US" sz="1600" dirty="0" smtClean="0"/>
-              <a:t>A popular technique that partitions data into sections to evaluate the ability of a model to generalize to out of sample observations. See example of 3-fold validation below.</a:t>
+              <a:t>A popular technique that partitions data into sections to evaluate the ability of a model to generalize to out of sample observations. </a:t>
             </a:r>
           </a:p>
           <a:p>
@@ -5835,7 +5835,11 @@
             </a:pPr>
             <a:r>
               <a:rPr lang="en-US" sz="1600" b="1" dirty="0" smtClean="0"/>
-              <a:t>Metrics for Classification:</a:t>
+              <a:t>Model Evaluation for Classification</a:t>
+            </a:r>
+            <a:r>
+              <a:rPr lang="en-US" sz="1600" b="1" dirty="0" smtClean="0"/>
+              <a:t>:</a:t>
             </a:r>
             <a:endParaRPr lang="en-US" sz="1600" dirty="0" smtClean="0"/>
           </a:p>
@@ -5850,7 +5854,7 @@
             </a:pPr>
             <a:r>
               <a:rPr lang="en-US" sz="1600" dirty="0" smtClean="0"/>
-              <a:t>Accuracy</a:t>
+              <a:t>Accuracy / Sensitivity / Specificity</a:t>
             </a:r>
           </a:p>
           <a:p>
@@ -5864,8 +5868,24 @@
             </a:pPr>
             <a:r>
               <a:rPr lang="en-US" sz="1600" dirty="0" smtClean="0"/>
-              <a:t>Receiver Operating Characteristic Area Under the Curve (ROC AUC)</a:t>
-            </a:r>
+              <a:t>Confusion Matrix</a:t>
+            </a:r>
+            <a:endParaRPr lang="en-US" sz="1600" dirty="0" smtClean="0"/>
+          </a:p>
+          <a:p>
+            <a:pPr marL="1200150" lvl="2" indent="-285750">
+              <a:spcBef>
+                <a:spcPts val="600"/>
+              </a:spcBef>
+              <a:buSzPct val="100000"/>
+              <a:buFont typeface="Arial" panose="020B0604020202020204" pitchFamily="34" charset="0"/>
+              <a:buChar char="•"/>
+            </a:pPr>
+            <a:r>
+              <a:rPr lang="en-US" sz="1600" dirty="0" smtClean="0"/>
+              <a:t>ROC AUC</a:t>
+            </a:r>
+            <a:endParaRPr lang="en-US" sz="1600" dirty="0" smtClean="0"/>
           </a:p>
           <a:p>
             <a:pPr marL="1200150" lvl="2" indent="-285750">
@@ -5889,8 +5909,9 @@
             </a:pPr>
             <a:r>
               <a:rPr lang="en-US" sz="1600" b="1" dirty="0" smtClean="0"/>
-              <a:t>Metrics for Regression: </a:t>
-            </a:r>
+              <a:t>Model Evaluation for Regression: </a:t>
+            </a:r>
+            <a:endParaRPr lang="en-US" sz="1600" b="1" dirty="0" smtClean="0"/>
           </a:p>
           <a:p>
             <a:pPr marL="1200150" lvl="2" indent="-285750">
@@ -5935,7 +5956,7 @@
         </p:nvSpPr>
         <p:spPr bwMode="gray">
           <a:xfrm>
-            <a:off x="1981200" y="2590800"/>
+            <a:off x="1981200" y="2340430"/>
             <a:ext cx="5486400" cy="331199"/>
           </a:xfrm>
           <a:prstGeom prst="rect">
@@ -5985,7 +6006,7 @@
         </p:nvSpPr>
         <p:spPr bwMode="gray">
           <a:xfrm>
-            <a:off x="1981200" y="2590800"/>
+            <a:off x="1981200" y="2340430"/>
             <a:ext cx="1828800" cy="331199"/>
           </a:xfrm>
           <a:prstGeom prst="rect">
@@ -6030,7 +6051,7 @@
         </p:nvSpPr>
         <p:spPr bwMode="gray">
           <a:xfrm>
-            <a:off x="1981200" y="3023099"/>
+            <a:off x="1981200" y="2772729"/>
             <a:ext cx="5486400" cy="331199"/>
           </a:xfrm>
           <a:prstGeom prst="rect">
@@ -6080,7 +6101,7 @@
         </p:nvSpPr>
         <p:spPr bwMode="gray">
           <a:xfrm>
-            <a:off x="3810000" y="3023099"/>
+            <a:off x="3810000" y="2772729"/>
             <a:ext cx="1828800" cy="331199"/>
           </a:xfrm>
           <a:prstGeom prst="rect">
@@ -6125,7 +6146,7 @@
         </p:nvSpPr>
         <p:spPr bwMode="gray">
           <a:xfrm>
-            <a:off x="1981200" y="3453900"/>
+            <a:off x="1981200" y="3203530"/>
             <a:ext cx="5486400" cy="331199"/>
           </a:xfrm>
           <a:prstGeom prst="rect">
@@ -6175,7 +6196,7 @@
         </p:nvSpPr>
         <p:spPr bwMode="gray">
           <a:xfrm>
-            <a:off x="5638800" y="3453900"/>
+            <a:off x="5638800" y="3203530"/>
             <a:ext cx="1828800" cy="331199"/>
           </a:xfrm>
           <a:prstGeom prst="rect">
@@ -6220,7 +6241,7 @@
         </p:nvSpPr>
         <p:spPr>
           <a:xfrm>
-            <a:off x="1371600" y="2667579"/>
+            <a:off x="1371600" y="2417209"/>
             <a:ext cx="1066800" cy="184666"/>
           </a:xfrm>
           <a:prstGeom prst="rect">
@@ -6274,7 +6295,7 @@
         </p:nvSpPr>
         <p:spPr>
           <a:xfrm>
-            <a:off x="1371600" y="3099878"/>
+            <a:off x="1371600" y="2849508"/>
             <a:ext cx="1066800" cy="184666"/>
           </a:xfrm>
           <a:prstGeom prst="rect">
@@ -6328,7 +6349,7 @@
         </p:nvSpPr>
         <p:spPr>
           <a:xfrm>
-            <a:off x="1371600" y="3530679"/>
+            <a:off x="1371600" y="3280309"/>
             <a:ext cx="1066800" cy="184666"/>
           </a:xfrm>
           <a:prstGeom prst="rect">
@@ -6374,7 +6395,7 @@
         </p:nvCxnSpPr>
         <p:spPr>
           <a:xfrm>
-            <a:off x="3810000" y="3453900"/>
+            <a:off x="3810000" y="3203530"/>
             <a:ext cx="0" cy="331199"/>
           </a:xfrm>
           <a:prstGeom prst="line">
@@ -6411,7 +6432,7 @@
         </p:nvCxnSpPr>
         <p:spPr>
           <a:xfrm>
-            <a:off x="5638800" y="2594312"/>
+            <a:off x="5638800" y="2343942"/>
             <a:ext cx="0" cy="331199"/>
           </a:xfrm>
           <a:prstGeom prst="line">
@@ -6440,6 +6461,551 @@
           </a:fontRef>
         </p:style>
       </p:cxnSp>
+      <p:graphicFrame>
+        <p:nvGraphicFramePr>
+          <p:cNvPr id="8" name="Table 7"/>
+          <p:cNvGraphicFramePr>
+            <a:graphicFrameLocks noGrp="1"/>
+          </p:cNvGraphicFramePr>
+          <p:nvPr>
+            <p:extLst>
+              <p:ext uri="{D42A27DB-BD31-4B8C-83A1-F6EECF244321}">
+                <p14:modId xmlns:p14="http://schemas.microsoft.com/office/powerpoint/2010/main" val="89378130"/>
+              </p:ext>
+            </p:extLst>
+          </p:nvPr>
+        </p:nvGraphicFramePr>
+        <p:xfrm>
+          <a:off x="6324600" y="4656418"/>
+          <a:ext cx="2145030" cy="1167048"/>
+        </p:xfrm>
+        <a:graphic>
+          <a:graphicData uri="http://schemas.openxmlformats.org/drawingml/2006/table">
+            <a:tbl>
+              <a:tblPr firstRow="1" firstCol="1" bandRow="1">
+                <a:tableStyleId>{21E4AEA4-8DFA-4A89-87EB-49C32662AFE0}</a:tableStyleId>
+              </a:tblPr>
+              <a:tblGrid>
+                <a:gridCol w="504190"/>
+                <a:gridCol w="925830"/>
+                <a:gridCol w="715010"/>
+              </a:tblGrid>
+              <a:tr h="381000">
+                <a:tc>
+                  <a:txBody>
+                    <a:bodyPr/>
+                    <a:lstStyle/>
+                    <a:p>
+                      <a:pPr marL="0" marR="0" algn="ctr">
+                        <a:lnSpc>
+                          <a:spcPct val="115000"/>
+                        </a:lnSpc>
+                        <a:spcBef>
+                          <a:spcPts val="0"/>
+                        </a:spcBef>
+                        <a:spcAft>
+                          <a:spcPts val="0"/>
+                        </a:spcAft>
+                      </a:pPr>
+                      <a:r>
+                        <a:rPr lang="en-US" sz="1100">
+                          <a:effectLst/>
+                        </a:rPr>
+                        <a:t> </a:t>
+                      </a:r>
+                      <a:endParaRPr lang="en-US" sz="1100">
+                        <a:effectLst/>
+                        <a:latin typeface="Calibri"/>
+                        <a:ea typeface="Calibri"/>
+                        <a:cs typeface="Times New Roman"/>
+                      </a:endParaRPr>
+                    </a:p>
+                  </a:txBody>
+                  <a:tcPr marL="68580" marR="68580" marT="0" marB="0" anchor="ctr"/>
+                </a:tc>
+                <a:tc>
+                  <a:txBody>
+                    <a:bodyPr/>
+                    <a:lstStyle/>
+                    <a:p>
+                      <a:pPr marL="0" marR="0" algn="ctr">
+                        <a:lnSpc>
+                          <a:spcPct val="115000"/>
+                        </a:lnSpc>
+                        <a:spcBef>
+                          <a:spcPts val="0"/>
+                        </a:spcBef>
+                        <a:spcAft>
+                          <a:spcPts val="0"/>
+                        </a:spcAft>
+                      </a:pPr>
+                      <a:r>
+                        <a:rPr lang="en-US" sz="1100">
+                          <a:effectLst/>
+                        </a:rPr>
+                        <a:t>No</a:t>
+                      </a:r>
+                      <a:endParaRPr lang="en-US" sz="1100">
+                        <a:effectLst/>
+                        <a:latin typeface="Calibri"/>
+                        <a:ea typeface="Calibri"/>
+                        <a:cs typeface="Times New Roman"/>
+                      </a:endParaRPr>
+                    </a:p>
+                  </a:txBody>
+                  <a:tcPr marL="68580" marR="68580" marT="0" marB="0" anchor="ctr"/>
+                </a:tc>
+                <a:tc>
+                  <a:txBody>
+                    <a:bodyPr/>
+                    <a:lstStyle/>
+                    <a:p>
+                      <a:pPr marL="0" marR="0" algn="ctr">
+                        <a:lnSpc>
+                          <a:spcPct val="115000"/>
+                        </a:lnSpc>
+                        <a:spcBef>
+                          <a:spcPts val="0"/>
+                        </a:spcBef>
+                        <a:spcAft>
+                          <a:spcPts val="0"/>
+                        </a:spcAft>
+                      </a:pPr>
+                      <a:r>
+                        <a:rPr lang="en-US" sz="1100">
+                          <a:effectLst/>
+                        </a:rPr>
+                        <a:t>Yes</a:t>
+                      </a:r>
+                      <a:endParaRPr lang="en-US" sz="1100">
+                        <a:effectLst/>
+                        <a:latin typeface="Calibri"/>
+                        <a:ea typeface="Calibri"/>
+                        <a:cs typeface="Times New Roman"/>
+                      </a:endParaRPr>
+                    </a:p>
+                  </a:txBody>
+                  <a:tcPr marL="68580" marR="68580" marT="0" marB="0" anchor="ctr"/>
+                </a:tc>
+              </a:tr>
+              <a:tr h="393024">
+                <a:tc>
+                  <a:txBody>
+                    <a:bodyPr/>
+                    <a:lstStyle/>
+                    <a:p>
+                      <a:pPr marL="0" marR="0" algn="ctr">
+                        <a:lnSpc>
+                          <a:spcPct val="115000"/>
+                        </a:lnSpc>
+                        <a:spcBef>
+                          <a:spcPts val="0"/>
+                        </a:spcBef>
+                        <a:spcAft>
+                          <a:spcPts val="0"/>
+                        </a:spcAft>
+                      </a:pPr>
+                      <a:r>
+                        <a:rPr lang="en-US" sz="1100">
+                          <a:effectLst/>
+                        </a:rPr>
+                        <a:t>No</a:t>
+                      </a:r>
+                      <a:endParaRPr lang="en-US" sz="1100">
+                        <a:effectLst/>
+                        <a:latin typeface="Calibri"/>
+                        <a:ea typeface="Calibri"/>
+                        <a:cs typeface="Times New Roman"/>
+                      </a:endParaRPr>
+                    </a:p>
+                  </a:txBody>
+                  <a:tcPr marL="68580" marR="68580" marT="0" marB="0" anchor="ctr"/>
+                </a:tc>
+                <a:tc>
+                  <a:txBody>
+                    <a:bodyPr/>
+                    <a:lstStyle/>
+                    <a:p>
+                      <a:pPr marL="0" marR="0" algn="ctr">
+                        <a:lnSpc>
+                          <a:spcPct val="115000"/>
+                        </a:lnSpc>
+                        <a:spcBef>
+                          <a:spcPts val="0"/>
+                        </a:spcBef>
+                        <a:spcAft>
+                          <a:spcPts val="0"/>
+                        </a:spcAft>
+                      </a:pPr>
+                      <a:r>
+                        <a:rPr lang="en-US" sz="1100">
+                          <a:effectLst/>
+                        </a:rPr>
+                        <a:t>TN</a:t>
+                      </a:r>
+                      <a:endParaRPr lang="en-US" sz="1100">
+                        <a:effectLst/>
+                        <a:latin typeface="Calibri"/>
+                        <a:ea typeface="Calibri"/>
+                        <a:cs typeface="Times New Roman"/>
+                      </a:endParaRPr>
+                    </a:p>
+                  </a:txBody>
+                  <a:tcPr marL="68580" marR="68580" marT="0" marB="0" anchor="ctr"/>
+                </a:tc>
+                <a:tc>
+                  <a:txBody>
+                    <a:bodyPr/>
+                    <a:lstStyle/>
+                    <a:p>
+                      <a:pPr marL="0" marR="0" algn="ctr">
+                        <a:lnSpc>
+                          <a:spcPct val="115000"/>
+                        </a:lnSpc>
+                        <a:spcBef>
+                          <a:spcPts val="0"/>
+                        </a:spcBef>
+                        <a:spcAft>
+                          <a:spcPts val="0"/>
+                        </a:spcAft>
+                      </a:pPr>
+                      <a:r>
+                        <a:rPr lang="en-US" sz="1100">
+                          <a:effectLst/>
+                        </a:rPr>
+                        <a:t>FP</a:t>
+                      </a:r>
+                      <a:endParaRPr lang="en-US" sz="1100">
+                        <a:effectLst/>
+                        <a:latin typeface="Calibri"/>
+                        <a:ea typeface="Calibri"/>
+                        <a:cs typeface="Times New Roman"/>
+                      </a:endParaRPr>
+                    </a:p>
+                  </a:txBody>
+                  <a:tcPr marL="68580" marR="68580" marT="0" marB="0" anchor="ctr"/>
+                </a:tc>
+              </a:tr>
+              <a:tr h="393024">
+                <a:tc>
+                  <a:txBody>
+                    <a:bodyPr/>
+                    <a:lstStyle/>
+                    <a:p>
+                      <a:pPr marL="0" marR="0" algn="ctr">
+                        <a:lnSpc>
+                          <a:spcPct val="115000"/>
+                        </a:lnSpc>
+                        <a:spcBef>
+                          <a:spcPts val="0"/>
+                        </a:spcBef>
+                        <a:spcAft>
+                          <a:spcPts val="0"/>
+                        </a:spcAft>
+                      </a:pPr>
+                      <a:r>
+                        <a:rPr lang="en-US" sz="1100">
+                          <a:effectLst/>
+                        </a:rPr>
+                        <a:t>Yes</a:t>
+                      </a:r>
+                      <a:endParaRPr lang="en-US" sz="1100">
+                        <a:effectLst/>
+                        <a:latin typeface="Calibri"/>
+                        <a:ea typeface="Calibri"/>
+                        <a:cs typeface="Times New Roman"/>
+                      </a:endParaRPr>
+                    </a:p>
+                  </a:txBody>
+                  <a:tcPr marL="68580" marR="68580" marT="0" marB="0" anchor="ctr"/>
+                </a:tc>
+                <a:tc>
+                  <a:txBody>
+                    <a:bodyPr/>
+                    <a:lstStyle/>
+                    <a:p>
+                      <a:pPr marL="0" marR="0" algn="ctr">
+                        <a:lnSpc>
+                          <a:spcPct val="115000"/>
+                        </a:lnSpc>
+                        <a:spcBef>
+                          <a:spcPts val="0"/>
+                        </a:spcBef>
+                        <a:spcAft>
+                          <a:spcPts val="0"/>
+                        </a:spcAft>
+                      </a:pPr>
+                      <a:r>
+                        <a:rPr lang="en-US" sz="1100">
+                          <a:effectLst/>
+                        </a:rPr>
+                        <a:t>FN</a:t>
+                      </a:r>
+                      <a:endParaRPr lang="en-US" sz="1100">
+                        <a:effectLst/>
+                        <a:latin typeface="Calibri"/>
+                        <a:ea typeface="Calibri"/>
+                        <a:cs typeface="Times New Roman"/>
+                      </a:endParaRPr>
+                    </a:p>
+                  </a:txBody>
+                  <a:tcPr marL="68580" marR="68580" marT="0" marB="0" anchor="ctr"/>
+                </a:tc>
+                <a:tc>
+                  <a:txBody>
+                    <a:bodyPr/>
+                    <a:lstStyle/>
+                    <a:p>
+                      <a:pPr marL="0" marR="0" algn="ctr">
+                        <a:lnSpc>
+                          <a:spcPct val="115000"/>
+                        </a:lnSpc>
+                        <a:spcBef>
+                          <a:spcPts val="0"/>
+                        </a:spcBef>
+                        <a:spcAft>
+                          <a:spcPts val="0"/>
+                        </a:spcAft>
+                      </a:pPr>
+                      <a:r>
+                        <a:rPr lang="en-US" sz="1100" dirty="0">
+                          <a:effectLst/>
+                        </a:rPr>
+                        <a:t>TP</a:t>
+                      </a:r>
+                      <a:endParaRPr lang="en-US" sz="1100" dirty="0">
+                        <a:effectLst/>
+                        <a:latin typeface="Calibri"/>
+                        <a:ea typeface="Calibri"/>
+                        <a:cs typeface="Times New Roman"/>
+                      </a:endParaRPr>
+                    </a:p>
+                  </a:txBody>
+                  <a:tcPr marL="68580" marR="68580" marT="0" marB="0" anchor="ctr"/>
+                </a:tc>
+              </a:tr>
+            </a:tbl>
+          </a:graphicData>
+        </a:graphic>
+      </p:graphicFrame>
+      <p:sp>
+        <p:nvSpPr>
+          <p:cNvPr id="10" name="TextBox 9"/>
+          <p:cNvSpPr txBox="1"/>
+          <p:nvPr/>
+        </p:nvSpPr>
+        <p:spPr>
+          <a:xfrm>
+            <a:off x="6324600" y="5951818"/>
+            <a:ext cx="2133600" cy="184666"/>
+          </a:xfrm>
+          <a:prstGeom prst="rect">
+            <a:avLst/>
+          </a:prstGeom>
+          <a:noFill/>
+        </p:spPr>
+        <p:txBody>
+          <a:bodyPr wrap="square" lIns="0" tIns="0" rIns="0" bIns="0" rtlCol="0">
+            <a:spAutoFit/>
+          </a:bodyPr>
+          <a:lstStyle/>
+          <a:p>
+            <a:pPr algn="ctr">
+              <a:spcBef>
+                <a:spcPts val="1200"/>
+              </a:spcBef>
+              <a:buSzPct val="25000"/>
+              <a:buFont typeface="Arial" panose="020B0604020202020204" pitchFamily="34" charset="0"/>
+              <a:buChar char="‏"/>
+            </a:pPr>
+            <a:r>
+              <a:rPr lang="en-US" sz="1200" b="1" dirty="0" smtClean="0">
+                <a:solidFill>
+                  <a:schemeClr val="tx2"/>
+                </a:solidFill>
+              </a:rPr>
+              <a:t>Confusion Matrix</a:t>
+            </a:r>
+            <a:endParaRPr lang="en-US" sz="1200" b="1" dirty="0">
+              <a:solidFill>
+                <a:schemeClr val="tx2"/>
+              </a:solidFill>
+            </a:endParaRPr>
+          </a:p>
+        </p:txBody>
+      </p:sp>
+      <p:sp>
+        <p:nvSpPr>
+          <p:cNvPr id="19" name="TextBox 18"/>
+          <p:cNvSpPr txBox="1"/>
+          <p:nvPr/>
+        </p:nvSpPr>
+        <p:spPr>
+          <a:xfrm>
+            <a:off x="3526971" y="3635830"/>
+            <a:ext cx="2133600" cy="184666"/>
+          </a:xfrm>
+          <a:prstGeom prst="rect">
+            <a:avLst/>
+          </a:prstGeom>
+          <a:noFill/>
+        </p:spPr>
+        <p:txBody>
+          <a:bodyPr wrap="square" lIns="0" tIns="0" rIns="0" bIns="0" rtlCol="0">
+            <a:spAutoFit/>
+          </a:bodyPr>
+          <a:lstStyle/>
+          <a:p>
+            <a:pPr algn="ctr">
+              <a:spcBef>
+                <a:spcPts val="1200"/>
+              </a:spcBef>
+              <a:buSzPct val="25000"/>
+              <a:buFont typeface="Arial" panose="020B0604020202020204" pitchFamily="34" charset="0"/>
+              <a:buChar char="‏"/>
+            </a:pPr>
+            <a:r>
+              <a:rPr lang="en-US" sz="1200" b="1" dirty="0" smtClean="0">
+                <a:solidFill>
+                  <a:schemeClr val="tx2"/>
+                </a:solidFill>
+              </a:rPr>
+              <a:t>3-Fold Cross-Validation</a:t>
+            </a:r>
+            <a:endParaRPr lang="en-US" sz="1200" b="1" dirty="0">
+              <a:solidFill>
+                <a:schemeClr val="tx2"/>
+              </a:solidFill>
+            </a:endParaRPr>
+          </a:p>
+        </p:txBody>
+      </p:sp>
+      <p:sp>
+        <p:nvSpPr>
+          <p:cNvPr id="22" name="TextBox 21"/>
+          <p:cNvSpPr txBox="1"/>
+          <p:nvPr/>
+        </p:nvSpPr>
+        <p:spPr>
+          <a:xfrm>
+            <a:off x="6400800" y="4191000"/>
+            <a:ext cx="2133600" cy="430887"/>
+          </a:xfrm>
+          <a:prstGeom prst="rect">
+            <a:avLst/>
+          </a:prstGeom>
+          <a:noFill/>
+        </p:spPr>
+        <p:txBody>
+          <a:bodyPr wrap="square" lIns="0" tIns="0" rIns="0" bIns="0" rtlCol="0">
+            <a:spAutoFit/>
+          </a:bodyPr>
+          <a:lstStyle/>
+          <a:p>
+            <a:pPr algn="ctr">
+              <a:buSzPct val="25000"/>
+              <a:buFont typeface="Arial" panose="020B0604020202020204" pitchFamily="34" charset="0"/>
+              <a:buChar char="‏"/>
+            </a:pPr>
+            <a:r>
+              <a:rPr lang="en-US" sz="1600" b="1" dirty="0" smtClean="0">
+                <a:solidFill>
+                  <a:schemeClr val="tx2"/>
+                </a:solidFill>
+              </a:rPr>
+              <a:t>Predicted</a:t>
+            </a:r>
+            <a:endParaRPr lang="en-US" sz="1200" b="1" dirty="0" smtClean="0">
+              <a:solidFill>
+                <a:schemeClr val="tx2"/>
+              </a:solidFill>
+            </a:endParaRPr>
+          </a:p>
+          <a:p>
+            <a:pPr algn="ctr">
+              <a:buSzPct val="25000"/>
+              <a:buFont typeface="Arial" panose="020B0604020202020204" pitchFamily="34" charset="0"/>
+              <a:buChar char="‏"/>
+            </a:pPr>
+            <a:r>
+              <a:rPr lang="en-US" sz="1200" dirty="0" smtClean="0">
+                <a:solidFill>
+                  <a:schemeClr val="tx2"/>
+                </a:solidFill>
+              </a:rPr>
+              <a:t>(Negative / Positive)</a:t>
+            </a:r>
+            <a:endParaRPr lang="en-US" sz="1200" dirty="0">
+              <a:solidFill>
+                <a:schemeClr val="tx2"/>
+              </a:solidFill>
+            </a:endParaRPr>
+          </a:p>
+        </p:txBody>
+      </p:sp>
+      <p:sp>
+        <p:nvSpPr>
+          <p:cNvPr id="24" name="TextBox 23"/>
+          <p:cNvSpPr txBox="1"/>
+          <p:nvPr/>
+        </p:nvSpPr>
+        <p:spPr>
+          <a:xfrm>
+            <a:off x="4757057" y="5207913"/>
+            <a:ext cx="2133600" cy="430887"/>
+          </a:xfrm>
+          <a:prstGeom prst="rect">
+            <a:avLst/>
+          </a:prstGeom>
+          <a:noFill/>
+        </p:spPr>
+        <p:txBody>
+          <a:bodyPr wrap="square" lIns="0" tIns="0" rIns="0" bIns="0" rtlCol="0">
+            <a:spAutoFit/>
+          </a:bodyPr>
+          <a:lstStyle/>
+          <a:p>
+            <a:pPr algn="ctr">
+              <a:buSzPct val="25000"/>
+              <a:buFont typeface="Arial" panose="020B0604020202020204" pitchFamily="34" charset="0"/>
+              <a:buChar char="‏"/>
+            </a:pPr>
+            <a:r>
+              <a:rPr lang="en-US" sz="1600" b="1" dirty="0" smtClean="0">
+                <a:solidFill>
+                  <a:schemeClr val="tx2"/>
+                </a:solidFill>
+              </a:rPr>
+              <a:t>Actual</a:t>
+            </a:r>
+            <a:endParaRPr lang="en-US" sz="1200" b="1" dirty="0" smtClean="0">
+              <a:solidFill>
+                <a:schemeClr val="tx2"/>
+              </a:solidFill>
+            </a:endParaRPr>
+          </a:p>
+          <a:p>
+            <a:pPr algn="ctr">
+              <a:buSzPct val="25000"/>
+              <a:buFont typeface="Arial" panose="020B0604020202020204" pitchFamily="34" charset="0"/>
+              <a:buChar char="‏"/>
+            </a:pPr>
+            <a:r>
+              <a:rPr lang="en-US" sz="1200" dirty="0" smtClean="0">
+                <a:solidFill>
+                  <a:schemeClr val="tx2"/>
+                </a:solidFill>
+              </a:rPr>
+              <a:t>(True/ False)</a:t>
+            </a:r>
+            <a:endParaRPr lang="en-US" sz="1200" dirty="0">
+              <a:solidFill>
+                <a:schemeClr val="tx2"/>
+              </a:solidFill>
+            </a:endParaRPr>
+          </a:p>
+        </p:txBody>
+      </p:sp>
     </p:spTree>
     <p:extLst>
       <p:ext uri="{BB962C8B-B14F-4D97-AF65-F5344CB8AC3E}">

</xml_diff>

<commit_message>
minor grammatical updates to confusion matrix
</commit_message>
<xml_diff>
--- a/trees_tuning.pptx
+++ b/trees_tuning.pptx
@@ -2558,7 +2558,7 @@
           <a:graphicData uri="http://schemas.openxmlformats.org/presentationml/2006/ole">
             <mc:AlternateContent xmlns:mc="http://schemas.openxmlformats.org/markup-compatibility/2006">
               <mc:Choice xmlns:v="urn:schemas-microsoft-com:vml" Requires="v">
-                <p:oleObj spid="_x0000_s2127" name="think-cell Slide" r:id="rId4" imgW="0" imgH="0" progId="TCLayout.ActiveDocument.1">
+                <p:oleObj spid="_x0000_s2129" name="think-cell Slide" r:id="rId4" imgW="0" imgH="0" progId="TCLayout.ActiveDocument.1">
                   <p:embed/>
                 </p:oleObj>
               </mc:Choice>
@@ -3031,7 +3031,7 @@
           <a:graphicData uri="http://schemas.openxmlformats.org/presentationml/2006/ole">
             <mc:AlternateContent xmlns:mc="http://schemas.openxmlformats.org/markup-compatibility/2006">
               <mc:Choice xmlns:v="urn:schemas-microsoft-com:vml" Requires="v">
-                <p:oleObj spid="_x0000_s1103" name="think-cell Slide" r:id="rId4" imgW="270" imgH="270" progId="TCLayout.ActiveDocument.1">
+                <p:oleObj spid="_x0000_s1105" name="think-cell Slide" r:id="rId4" imgW="270" imgH="270" progId="TCLayout.ActiveDocument.1">
                   <p:embed/>
                 </p:oleObj>
               </mc:Choice>
@@ -6470,7 +6470,7 @@
           <p:nvPr>
             <p:extLst>
               <p:ext uri="{D42A27DB-BD31-4B8C-83A1-F6EECF244321}">
-                <p14:modId xmlns:p14="http://schemas.microsoft.com/office/powerpoint/2010/main" val="89378130"/>
+                <p14:modId xmlns:p14="http://schemas.microsoft.com/office/powerpoint/2010/main" val="447840297"/>
               </p:ext>
             </p:extLst>
           </p:nvPr>
@@ -6508,12 +6508,12 @@
                         </a:spcAft>
                       </a:pPr>
                       <a:r>
-                        <a:rPr lang="en-US" sz="1100">
+                        <a:rPr lang="en-US" sz="1100" dirty="0">
                           <a:effectLst/>
                         </a:rPr>
                         <a:t> </a:t>
                       </a:r>
-                      <a:endParaRPr lang="en-US" sz="1100">
+                      <a:endParaRPr lang="en-US" sz="1100" dirty="0">
                         <a:effectLst/>
                         <a:latin typeface="Calibri"/>
                         <a:ea typeface="Calibri"/>
@@ -6540,12 +6540,12 @@
                         </a:spcAft>
                       </a:pPr>
                       <a:r>
-                        <a:rPr lang="en-US" sz="1100">
+                        <a:rPr lang="en-US" sz="1400">
                           <a:effectLst/>
                         </a:rPr>
                         <a:t>No</a:t>
                       </a:r>
-                      <a:endParaRPr lang="en-US" sz="1100">
+                      <a:endParaRPr lang="en-US" sz="1400">
                         <a:effectLst/>
                         <a:latin typeface="Calibri"/>
                         <a:ea typeface="Calibri"/>
@@ -6572,12 +6572,12 @@
                         </a:spcAft>
                       </a:pPr>
                       <a:r>
-                        <a:rPr lang="en-US" sz="1100">
+                        <a:rPr lang="en-US" sz="1400" dirty="0">
                           <a:effectLst/>
                         </a:rPr>
                         <a:t>Yes</a:t>
                       </a:r>
-                      <a:endParaRPr lang="en-US" sz="1100">
+                      <a:endParaRPr lang="en-US" sz="1400" dirty="0">
                         <a:effectLst/>
                         <a:latin typeface="Calibri"/>
                         <a:ea typeface="Calibri"/>
@@ -6606,12 +6606,12 @@
                         </a:spcAft>
                       </a:pPr>
                       <a:r>
-                        <a:rPr lang="en-US" sz="1100">
+                        <a:rPr lang="en-US" sz="1400" dirty="0">
                           <a:effectLst/>
                         </a:rPr>
                         <a:t>No</a:t>
                       </a:r>
-                      <a:endParaRPr lang="en-US" sz="1100">
+                      <a:endParaRPr lang="en-US" sz="1400" dirty="0">
                         <a:effectLst/>
                         <a:latin typeface="Calibri"/>
                         <a:ea typeface="Calibri"/>
@@ -6638,12 +6638,12 @@
                         </a:spcAft>
                       </a:pPr>
                       <a:r>
-                        <a:rPr lang="en-US" sz="1100">
+                        <a:rPr lang="en-US" sz="1100" b="1">
                           <a:effectLst/>
                         </a:rPr>
                         <a:t>TN</a:t>
                       </a:r>
-                      <a:endParaRPr lang="en-US" sz="1100">
+                      <a:endParaRPr lang="en-US" sz="1100" b="1">
                         <a:effectLst/>
                         <a:latin typeface="Calibri"/>
                         <a:ea typeface="Calibri"/>
@@ -6670,12 +6670,12 @@
                         </a:spcAft>
                       </a:pPr>
                       <a:r>
-                        <a:rPr lang="en-US" sz="1100">
+                        <a:rPr lang="en-US" sz="1100" b="1">
                           <a:effectLst/>
                         </a:rPr>
                         <a:t>FP</a:t>
                       </a:r>
-                      <a:endParaRPr lang="en-US" sz="1100">
+                      <a:endParaRPr lang="en-US" sz="1100" b="1">
                         <a:effectLst/>
                         <a:latin typeface="Calibri"/>
                         <a:ea typeface="Calibri"/>
@@ -6704,12 +6704,12 @@
                         </a:spcAft>
                       </a:pPr>
                       <a:r>
-                        <a:rPr lang="en-US" sz="1100">
+                        <a:rPr lang="en-US" sz="1400" dirty="0">
                           <a:effectLst/>
                         </a:rPr>
                         <a:t>Yes</a:t>
                       </a:r>
-                      <a:endParaRPr lang="en-US" sz="1100">
+                      <a:endParaRPr lang="en-US" sz="1400" dirty="0">
                         <a:effectLst/>
                         <a:latin typeface="Calibri"/>
                         <a:ea typeface="Calibri"/>
@@ -6736,12 +6736,12 @@
                         </a:spcAft>
                       </a:pPr>
                       <a:r>
-                        <a:rPr lang="en-US" sz="1100">
+                        <a:rPr lang="en-US" sz="1100" b="1">
                           <a:effectLst/>
                         </a:rPr>
                         <a:t>FN</a:t>
                       </a:r>
-                      <a:endParaRPr lang="en-US" sz="1100">
+                      <a:endParaRPr lang="en-US" sz="1100" b="1">
                         <a:effectLst/>
                         <a:latin typeface="Calibri"/>
                         <a:ea typeface="Calibri"/>
@@ -6768,12 +6768,12 @@
                         </a:spcAft>
                       </a:pPr>
                       <a:r>
-                        <a:rPr lang="en-US" sz="1100" dirty="0">
+                        <a:rPr lang="en-US" sz="1100" b="1" dirty="0">
                           <a:effectLst/>
                         </a:rPr>
                         <a:t>TP</a:t>
                       </a:r>
-                      <a:endParaRPr lang="en-US" sz="1100" dirty="0">
+                      <a:endParaRPr lang="en-US" sz="1100" b="1" dirty="0">
                         <a:effectLst/>
                         <a:latin typeface="Calibri"/>
                         <a:ea typeface="Calibri"/>

</xml_diff>

<commit_message>
Minor modifications to the confusion matrix
</commit_message>
<xml_diff>
--- a/trees_tuning.pptx
+++ b/trees_tuning.pptx
@@ -111,7 +111,7 @@
   </p:defaultTextStyle>
   <p:extLst>
     <p:ext uri="{EFAFB233-063F-42B5-8137-9DF3F51BA10A}">
-      <p15:sldGuideLst xmlns="" xmlns:p15="http://schemas.microsoft.com/office/powerpoint/2012/main">
+      <p15:sldGuideLst xmlns:p15="http://schemas.microsoft.com/office/powerpoint/2012/main" xmlns="">
         <p15:guide id="1" orient="horz" pos="2160">
           <p15:clr>
             <a:srgbClr val="A4A3A4"/>
@@ -219,7 +219,7 @@
           <a:p>
             <a:fld id="{EF429FB9-6BAA-48A3-B518-22DDBBA6A7C6}" type="datetimeFigureOut">
               <a:rPr lang="en-US" smtClean="0"/>
-              <a:t>4/20/2015</a:t>
+              <a:t>4/21/2015</a:t>
             </a:fld>
             <a:endParaRPr lang="en-US"/>
           </a:p>
@@ -2558,7 +2558,7 @@
           <a:graphicData uri="http://schemas.openxmlformats.org/presentationml/2006/ole">
             <mc:AlternateContent xmlns:mc="http://schemas.openxmlformats.org/markup-compatibility/2006">
               <mc:Choice xmlns:v="urn:schemas-microsoft-com:vml" Requires="v">
-                <p:oleObj spid="_x0000_s2129" name="think-cell Slide" r:id="rId4" imgW="0" imgH="0" progId="TCLayout.ActiveDocument.1">
+                <p:oleObj spid="_x0000_s2130" name="think-cell Slide" r:id="rId4" imgW="0" imgH="0" progId="TCLayout.ActiveDocument.1">
                   <p:embed/>
                 </p:oleObj>
               </mc:Choice>
@@ -3031,7 +3031,7 @@
           <a:graphicData uri="http://schemas.openxmlformats.org/presentationml/2006/ole">
             <mc:AlternateContent xmlns:mc="http://schemas.openxmlformats.org/markup-compatibility/2006">
               <mc:Choice xmlns:v="urn:schemas-microsoft-com:vml" Requires="v">
-                <p:oleObj spid="_x0000_s1105" name="think-cell Slide" r:id="rId4" imgW="270" imgH="270" progId="TCLayout.ActiveDocument.1">
+                <p:oleObj spid="_x0000_s1106" name="think-cell Slide" r:id="rId4" imgW="270" imgH="270" progId="TCLayout.ActiveDocument.1">
                   <p:embed/>
                 </p:oleObj>
               </mc:Choice>
@@ -5835,11 +5835,7 @@
             </a:pPr>
             <a:r>
               <a:rPr lang="en-US" sz="1600" b="1" dirty="0" smtClean="0"/>
-              <a:t>Model Evaluation for Classification</a:t>
-            </a:r>
-            <a:r>
-              <a:rPr lang="en-US" sz="1600" b="1" dirty="0" smtClean="0"/>
-              <a:t>:</a:t>
+              <a:t>Model Evaluation for Classification:</a:t>
             </a:r>
             <a:endParaRPr lang="en-US" sz="1600" dirty="0" smtClean="0"/>
           </a:p>
@@ -5870,7 +5866,6 @@
               <a:rPr lang="en-US" sz="1600" dirty="0" smtClean="0"/>
               <a:t>Confusion Matrix</a:t>
             </a:r>
-            <a:endParaRPr lang="en-US" sz="1600" dirty="0" smtClean="0"/>
           </a:p>
           <a:p>
             <a:pPr marL="1200150" lvl="2" indent="-285750">
@@ -5885,7 +5880,6 @@
               <a:rPr lang="en-US" sz="1600" dirty="0" smtClean="0"/>
               <a:t>ROC AUC</a:t>
             </a:r>
-            <a:endParaRPr lang="en-US" sz="1600" dirty="0" smtClean="0"/>
           </a:p>
           <a:p>
             <a:pPr marL="1200150" lvl="2" indent="-285750">
@@ -5911,7 +5905,6 @@
               <a:rPr lang="en-US" sz="1600" b="1" dirty="0" smtClean="0"/>
               <a:t>Model Evaluation for Regression: </a:t>
             </a:r>
-            <a:endParaRPr lang="en-US" sz="1600" b="1" dirty="0" smtClean="0"/>
           </a:p>
           <a:p>
             <a:pPr marL="1200150" lvl="2" indent="-285750">
@@ -6470,7 +6463,7 @@
           <p:nvPr>
             <p:extLst>
               <p:ext uri="{D42A27DB-BD31-4B8C-83A1-F6EECF244321}">
-                <p14:modId xmlns:p14="http://schemas.microsoft.com/office/powerpoint/2010/main" val="447840297"/>
+                <p14:modId xmlns:p14="http://schemas.microsoft.com/office/powerpoint/2010/main" val="1891083940"/>
               </p:ext>
             </p:extLst>
           </p:nvPr>
@@ -6638,12 +6631,12 @@
                         </a:spcAft>
                       </a:pPr>
                       <a:r>
-                        <a:rPr lang="en-US" sz="1100" b="1">
+                        <a:rPr lang="en-US" sz="1400" b="1">
                           <a:effectLst/>
                         </a:rPr>
                         <a:t>TN</a:t>
                       </a:r>
-                      <a:endParaRPr lang="en-US" sz="1100" b="1">
+                      <a:endParaRPr lang="en-US" sz="1400" b="1">
                         <a:effectLst/>
                         <a:latin typeface="Calibri"/>
                         <a:ea typeface="Calibri"/>
@@ -6651,7 +6644,13 @@
                       </a:endParaRPr>
                     </a:p>
                   </a:txBody>
-                  <a:tcPr marL="68580" marR="68580" marT="0" marB="0" anchor="ctr"/>
+                  <a:tcPr marL="68580" marR="68580" marT="0" marB="0" anchor="ctr">
+                    <a:solidFill>
+                      <a:schemeClr val="bg1">
+                        <a:lumMod val="85000"/>
+                      </a:schemeClr>
+                    </a:solidFill>
+                  </a:tcPr>
                 </a:tc>
                 <a:tc>
                   <a:txBody>
@@ -6670,12 +6669,12 @@
                         </a:spcAft>
                       </a:pPr>
                       <a:r>
-                        <a:rPr lang="en-US" sz="1100" b="1">
+                        <a:rPr lang="en-US" sz="1400" b="1">
                           <a:effectLst/>
                         </a:rPr>
                         <a:t>FP</a:t>
                       </a:r>
-                      <a:endParaRPr lang="en-US" sz="1100" b="1">
+                      <a:endParaRPr lang="en-US" sz="1400" b="1">
                         <a:effectLst/>
                         <a:latin typeface="Calibri"/>
                         <a:ea typeface="Calibri"/>
@@ -6683,7 +6682,13 @@
                       </a:endParaRPr>
                     </a:p>
                   </a:txBody>
-                  <a:tcPr marL="68580" marR="68580" marT="0" marB="0" anchor="ctr"/>
+                  <a:tcPr marL="68580" marR="68580" marT="0" marB="0" anchor="ctr">
+                    <a:solidFill>
+                      <a:schemeClr val="bg1">
+                        <a:lumMod val="85000"/>
+                      </a:schemeClr>
+                    </a:solidFill>
+                  </a:tcPr>
                 </a:tc>
               </a:tr>
               <a:tr h="393024">
@@ -6736,12 +6741,12 @@
                         </a:spcAft>
                       </a:pPr>
                       <a:r>
-                        <a:rPr lang="en-US" sz="1100" b="1">
+                        <a:rPr lang="en-US" sz="1400" b="1">
                           <a:effectLst/>
                         </a:rPr>
                         <a:t>FN</a:t>
                       </a:r>
-                      <a:endParaRPr lang="en-US" sz="1100" b="1">
+                      <a:endParaRPr lang="en-US" sz="1400" b="1">
                         <a:effectLst/>
                         <a:latin typeface="Calibri"/>
                         <a:ea typeface="Calibri"/>
@@ -6749,7 +6754,13 @@
                       </a:endParaRPr>
                     </a:p>
                   </a:txBody>
-                  <a:tcPr marL="68580" marR="68580" marT="0" marB="0" anchor="ctr"/>
+                  <a:tcPr marL="68580" marR="68580" marT="0" marB="0" anchor="ctr">
+                    <a:solidFill>
+                      <a:schemeClr val="bg1">
+                        <a:lumMod val="85000"/>
+                      </a:schemeClr>
+                    </a:solidFill>
+                  </a:tcPr>
                 </a:tc>
                 <a:tc>
                   <a:txBody>
@@ -6768,12 +6779,12 @@
                         </a:spcAft>
                       </a:pPr>
                       <a:r>
-                        <a:rPr lang="en-US" sz="1100" b="1" dirty="0">
+                        <a:rPr lang="en-US" sz="1400" b="1" dirty="0">
                           <a:effectLst/>
                         </a:rPr>
                         <a:t>TP</a:t>
                       </a:r>
-                      <a:endParaRPr lang="en-US" sz="1100" b="1" dirty="0">
+                      <a:endParaRPr lang="en-US" sz="1400" b="1" dirty="0">
                         <a:effectLst/>
                         <a:latin typeface="Calibri"/>
                         <a:ea typeface="Calibri"/>
@@ -6781,7 +6792,13 @@
                       </a:endParaRPr>
                     </a:p>
                   </a:txBody>
-                  <a:tcPr marL="68580" marR="68580" marT="0" marB="0" anchor="ctr"/>
+                  <a:tcPr marL="68580" marR="68580" marT="0" marB="0" anchor="ctr">
+                    <a:solidFill>
+                      <a:schemeClr val="bg1">
+                        <a:lumMod val="85000"/>
+                      </a:schemeClr>
+                    </a:solidFill>
+                  </a:tcPr>
                 </a:tc>
               </a:tr>
             </a:tbl>

</xml_diff>